<commit_message>
update image pptx and png
</commit_message>
<xml_diff>
--- a/images/vsan-1box-setup-2019.pptx
+++ b/images/vsan-1box-setup-2019.pptx
@@ -189,7 +189,7 @@
 <file path=ppt/revisionInfo.xml><?xml version="1.0" encoding="utf-8"?>
 <p1510:revInfo xmlns:a="http://schemas.openxmlformats.org/drawingml/2006/main" xmlns:r="http://schemas.openxmlformats.org/officeDocument/2006/relationships" xmlns:p1510="http://schemas.microsoft.com/office/powerpoint/2015/10/main">
   <p1510:revLst>
-    <p1510:client id="{05A99237-2BBE-4F6F-BA78-1E31295F3D10}" v="88" dt="2020-01-05T15:22:28.709"/>
+    <p1510:client id="{E294D410-3668-414E-AC86-9282CD31CFBA}" v="14" dt="2020-01-11T09:58:16.809"/>
   </p1510:revLst>
 </p1510:revInfo>
 </file>
@@ -276,7 +276,7 @@
           <a:p>
             <a:fld id="{FB004553-04C5-4BB3-AD4E-8B2EF3CDDAF9}" type="datetimeFigureOut">
               <a:rPr lang="en-US" smtClean="0"/>
-              <a:t>1/5/2020</a:t>
+              <a:t>1/11/2020</a:t>
             </a:fld>
             <a:endParaRPr lang="en-US"/>
           </a:p>
@@ -441,7 +441,7 @@
           <a:p>
             <a:fld id="{3CB6F0DB-E055-41D0-9102-627A646E4242}" type="datetimeFigureOut">
               <a:rPr lang="en-US" smtClean="0"/>
-              <a:t>1/5/2020</a:t>
+              <a:t>1/11/2020</a:t>
             </a:fld>
             <a:endParaRPr lang="en-US"/>
           </a:p>
@@ -1447,7 +1447,7 @@
             </a:ln>
             <a:extLst>
               <a:ext uri="{91240B29-F687-4f45-9708-019B960494DF}">
-                <a14:hiddenLine xmlns="" xmlns:a14="http://schemas.microsoft.com/office/drawing/2010/main" w="9525">
+                <a14:hiddenLine xmlns:a14="http://schemas.microsoft.com/office/drawing/2010/main" xmlns="" w="9525">
                   <a:solidFill>
                     <a:srgbClr val="000000"/>
                   </a:solidFill>
@@ -1619,7 +1619,7 @@
             </a:ln>
             <a:extLst>
               <a:ext uri="{91240B29-F687-4f45-9708-019B960494DF}">
-                <a14:hiddenLine xmlns="" xmlns:a14="http://schemas.microsoft.com/office/drawing/2010/main" w="9525">
+                <a14:hiddenLine xmlns:a14="http://schemas.microsoft.com/office/drawing/2010/main" xmlns="" w="9525">
                   <a:solidFill>
                     <a:srgbClr val="000000"/>
                   </a:solidFill>
@@ -1839,7 +1839,7 @@
             </a:ln>
             <a:extLst>
               <a:ext uri="{91240B29-F687-4f45-9708-019B960494DF}">
-                <a14:hiddenLine xmlns="" xmlns:a14="http://schemas.microsoft.com/office/drawing/2010/main" w="9525">
+                <a14:hiddenLine xmlns:a14="http://schemas.microsoft.com/office/drawing/2010/main" xmlns="" w="9525">
                   <a:solidFill>
                     <a:srgbClr val="000000"/>
                   </a:solidFill>
@@ -2150,7 +2150,7 @@
             </a:ln>
             <a:extLst>
               <a:ext uri="{91240B29-F687-4f45-9708-019B960494DF}">
-                <a14:hiddenLine xmlns="" xmlns:a14="http://schemas.microsoft.com/office/drawing/2010/main" w="9525">
+                <a14:hiddenLine xmlns:a14="http://schemas.microsoft.com/office/drawing/2010/main" xmlns="" w="9525">
                   <a:solidFill>
                     <a:srgbClr val="000000"/>
                   </a:solidFill>
@@ -2532,7 +2532,7 @@
             </a:ln>
             <a:extLst>
               <a:ext uri="{91240B29-F687-4f45-9708-019B960494DF}">
-                <a14:hiddenLine xmlns="" xmlns:a14="http://schemas.microsoft.com/office/drawing/2010/main" w="9525">
+                <a14:hiddenLine xmlns:a14="http://schemas.microsoft.com/office/drawing/2010/main" xmlns="" w="9525">
                   <a:solidFill>
                     <a:srgbClr val="000000"/>
                   </a:solidFill>
@@ -2723,7 +2723,7 @@
             </a:ln>
             <a:extLst>
               <a:ext uri="{91240B29-F687-4f45-9708-019B960494DF}">
-                <a14:hiddenLine xmlns="" xmlns:a14="http://schemas.microsoft.com/office/drawing/2010/main" w="9525">
+                <a14:hiddenLine xmlns:a14="http://schemas.microsoft.com/office/drawing/2010/main" xmlns="" w="9525">
                   <a:solidFill>
                     <a:srgbClr val="000000"/>
                   </a:solidFill>
@@ -3012,7 +3012,7 @@
             </a:ln>
             <a:extLst>
               <a:ext uri="{91240B29-F687-4f45-9708-019B960494DF}">
-                <a14:hiddenLine xmlns="" xmlns:a14="http://schemas.microsoft.com/office/drawing/2010/main" w="9525">
+                <a14:hiddenLine xmlns:a14="http://schemas.microsoft.com/office/drawing/2010/main" xmlns="" w="9525">
                   <a:solidFill>
                     <a:srgbClr val="000000"/>
                   </a:solidFill>
@@ -7324,64 +7324,108 @@
                 <a:latin typeface="メイリオ" panose="020B0604030504040204" pitchFamily="50" charset="-128"/>
                 <a:ea typeface="メイリオ" panose="020B0604030504040204" pitchFamily="50" charset="-128"/>
               </a:rPr>
-              <a:t>PowerCLI&gt; ./setup_vSAN-Cluster.ps1 ./configs/base-env/env_home-lab-01.ps1 ./configs/cluster/conf_vSAN-Cluster-01_Hybrid.ps1</a:t>
-            </a:r>
-            <a:endParaRPr kumimoji="1" lang="ja-JP" altLang="en-US" sz="1200" dirty="0">
-              <a:solidFill>
-                <a:schemeClr val="tx2"/>
-              </a:solidFill>
-              <a:latin typeface="メイリオ" panose="020B0604030504040204" pitchFamily="50" charset="-128"/>
-              <a:ea typeface="メイリオ" panose="020B0604030504040204" pitchFamily="50" charset="-128"/>
-            </a:endParaRPr>
-          </a:p>
-        </p:txBody>
-      </p:sp>
-      <p:sp>
-        <p:nvSpPr>
-          <p:cNvPr id="124" name="矢印: 右カーブ 123">
-            <a:extLst>
-              <a:ext uri="{FF2B5EF4-FFF2-40B4-BE49-F238E27FC236}">
-                <a16:creationId xmlns:a16="http://schemas.microsoft.com/office/drawing/2014/main" id="{03680EB2-1DC6-469F-A19C-BA2BED91B36A}"/>
-              </a:ext>
-            </a:extLst>
-          </p:cNvPr>
-          <p:cNvSpPr/>
-          <p:nvPr/>
-        </p:nvSpPr>
-        <p:spPr>
-          <a:xfrm rot="11160879" flipV="1">
-            <a:off x="11467647" y="3705018"/>
-            <a:ext cx="257598" cy="1337461"/>
-          </a:xfrm>
-          <a:prstGeom prst="curvedRightArrow">
-            <a:avLst/>
-          </a:prstGeom>
-          <a:ln/>
-        </p:spPr>
-        <p:style>
-          <a:lnRef idx="2">
-            <a:schemeClr val="dk1"/>
-          </a:lnRef>
-          <a:fillRef idx="1">
-            <a:schemeClr val="lt1"/>
-          </a:fillRef>
-          <a:effectRef idx="0">
-            <a:schemeClr val="dk1"/>
-          </a:effectRef>
-          <a:fontRef idx="minor">
-            <a:schemeClr val="dk1"/>
-          </a:fontRef>
-        </p:style>
-        <p:txBody>
-          <a:bodyPr rtlCol="0" anchor="ctr"/>
-          <a:lstStyle/>
-          <a:p>
-            <a:pPr algn="ctr"/>
-            <a:endParaRPr kumimoji="1" lang="ja-JP" altLang="en-US" dirty="0">
-              <a:solidFill>
-                <a:schemeClr val="tx2"/>
-              </a:solidFill>
-            </a:endParaRPr>
+              <a:t>PowerCLI&gt; </a:t>
+            </a:r>
+            <a:r>
+              <a:rPr kumimoji="1" lang="en-US" altLang="ja-JP" sz="1200" b="1" dirty="0">
+                <a:solidFill>
+                  <a:schemeClr val="tx2"/>
+                </a:solidFill>
+                <a:latin typeface="メイリオ" panose="020B0604030504040204" pitchFamily="50" charset="-128"/>
+                <a:ea typeface="メイリオ" panose="020B0604030504040204" pitchFamily="50" charset="-128"/>
+              </a:rPr>
+              <a:t>./setup_vSAN-Cluster.ps1 </a:t>
+            </a:r>
+            <a:r>
+              <a:rPr kumimoji="1" lang="ja-JP" altLang="en-US" sz="1200" b="1" dirty="0">
+                <a:solidFill>
+                  <a:schemeClr val="tx2"/>
+                </a:solidFill>
+                <a:latin typeface="メイリオ" panose="020B0604030504040204" pitchFamily="50" charset="-128"/>
+                <a:ea typeface="メイリオ" panose="020B0604030504040204" pitchFamily="50" charset="-128"/>
+              </a:rPr>
+              <a:t>＜</a:t>
+            </a:r>
+            <a:r>
+              <a:rPr kumimoji="1" lang="en-US" altLang="ja-JP" sz="1200" b="1" dirty="0">
+                <a:solidFill>
+                  <a:schemeClr val="tx2"/>
+                </a:solidFill>
+                <a:latin typeface="メイリオ" panose="020B0604030504040204" pitchFamily="50" charset="-128"/>
+                <a:ea typeface="メイリオ" panose="020B0604030504040204" pitchFamily="50" charset="-128"/>
+              </a:rPr>
+              <a:t>Config</a:t>
+            </a:r>
+            <a:r>
+              <a:rPr kumimoji="1" lang="ja-JP" altLang="en-US" sz="1200" b="1" dirty="0">
+                <a:solidFill>
+                  <a:schemeClr val="tx2"/>
+                </a:solidFill>
+                <a:latin typeface="メイリオ" panose="020B0604030504040204" pitchFamily="50" charset="-128"/>
+                <a:ea typeface="メイリオ" panose="020B0604030504040204" pitchFamily="50" charset="-128"/>
+              </a:rPr>
+              <a:t> </a:t>
+            </a:r>
+            <a:r>
+              <a:rPr kumimoji="1" lang="en-US" altLang="ja-JP" sz="1200" b="1" dirty="0">
+                <a:solidFill>
+                  <a:schemeClr val="tx2"/>
+                </a:solidFill>
+                <a:latin typeface="メイリオ" panose="020B0604030504040204" pitchFamily="50" charset="-128"/>
+                <a:ea typeface="メイリオ" panose="020B0604030504040204" pitchFamily="50" charset="-128"/>
+              </a:rPr>
+              <a:t>File</a:t>
+            </a:r>
+            <a:r>
+              <a:rPr kumimoji="1" lang="ja-JP" altLang="en-US" sz="1200" b="1" dirty="0">
+                <a:solidFill>
+                  <a:schemeClr val="tx2"/>
+                </a:solidFill>
+                <a:latin typeface="メイリオ" panose="020B0604030504040204" pitchFamily="50" charset="-128"/>
+                <a:ea typeface="メイリオ" panose="020B0604030504040204" pitchFamily="50" charset="-128"/>
+              </a:rPr>
+              <a:t> </a:t>
+            </a:r>
+            <a:r>
+              <a:rPr kumimoji="1" lang="en-US" altLang="ja-JP" sz="1200" b="1" dirty="0">
+                <a:solidFill>
+                  <a:schemeClr val="tx2"/>
+                </a:solidFill>
+                <a:latin typeface="メイリオ" panose="020B0604030504040204" pitchFamily="50" charset="-128"/>
+                <a:ea typeface="メイリオ" panose="020B0604030504040204" pitchFamily="50" charset="-128"/>
+              </a:rPr>
+              <a:t>:</a:t>
+            </a:r>
+            <a:r>
+              <a:rPr kumimoji="1" lang="ja-JP" altLang="en-US" sz="1200" b="1" dirty="0">
+                <a:solidFill>
+                  <a:schemeClr val="tx2"/>
+                </a:solidFill>
+                <a:latin typeface="メイリオ" panose="020B0604030504040204" pitchFamily="50" charset="-128"/>
+                <a:ea typeface="メイリオ" panose="020B0604030504040204" pitchFamily="50" charset="-128"/>
+              </a:rPr>
+              <a:t>例 </a:t>
+            </a:r>
+            <a:r>
+              <a:rPr kumimoji="1" lang="en-US" altLang="ja-JP" sz="1200" b="1" dirty="0">
+                <a:solidFill>
+                  <a:schemeClr val="tx2"/>
+                </a:solidFill>
+                <a:latin typeface="メイリオ" panose="020B0604030504040204" pitchFamily="50" charset="-128"/>
+                <a:ea typeface="メイリオ" panose="020B0604030504040204" pitchFamily="50" charset="-128"/>
+              </a:rPr>
+              <a:t>./configs/cluster/conf_vSAN-Cluster-01_Hybrid.ps1</a:t>
+            </a:r>
+            <a:r>
+              <a:rPr kumimoji="1" lang="ja-JP" altLang="en-US" sz="1200" b="1" dirty="0">
+                <a:solidFill>
+                  <a:schemeClr val="tx2"/>
+                </a:solidFill>
+                <a:latin typeface="メイリオ" panose="020B0604030504040204" pitchFamily="50" charset="-128"/>
+                <a:ea typeface="メイリオ" panose="020B0604030504040204" pitchFamily="50" charset="-128"/>
+              </a:rPr>
+              <a:t>＞</a:t>
+            </a:r>
           </a:p>
         </p:txBody>
       </p:sp>
@@ -7529,7 +7573,60 @@
         </p:nvSpPr>
         <p:spPr>
           <a:xfrm rot="11160879" flipV="1">
-            <a:off x="11402381" y="3796722"/>
+            <a:off x="11385067" y="3796722"/>
+            <a:ext cx="307875" cy="643271"/>
+          </a:xfrm>
+          <a:prstGeom prst="curvedRightArrow">
+            <a:avLst>
+              <a:gd name="adj1" fmla="val 20062"/>
+              <a:gd name="adj2" fmla="val 45624"/>
+              <a:gd name="adj3" fmla="val 47421"/>
+            </a:avLst>
+          </a:prstGeom>
+          <a:ln/>
+        </p:spPr>
+        <p:style>
+          <a:lnRef idx="2">
+            <a:schemeClr val="dk1"/>
+          </a:lnRef>
+          <a:fillRef idx="1">
+            <a:schemeClr val="lt1"/>
+          </a:fillRef>
+          <a:effectRef idx="0">
+            <a:schemeClr val="dk1"/>
+          </a:effectRef>
+          <a:fontRef idx="minor">
+            <a:schemeClr val="dk1"/>
+          </a:fontRef>
+        </p:style>
+        <p:txBody>
+          <a:bodyPr rtlCol="0" anchor="ctr"/>
+          <a:lstStyle/>
+          <a:p>
+            <a:pPr algn="ctr"/>
+            <a:endParaRPr kumimoji="1" lang="ja-JP" altLang="en-US" dirty="0">
+              <a:solidFill>
+                <a:schemeClr val="tx2"/>
+              </a:solidFill>
+            </a:endParaRPr>
+          </a:p>
+        </p:txBody>
+      </p:sp>
+      <p:sp>
+        <p:nvSpPr>
+          <p:cNvPr id="46" name="矢印: 右カーブ 45">
+            <a:extLst>
+              <a:ext uri="{FF2B5EF4-FFF2-40B4-BE49-F238E27FC236}">
+                <a16:creationId xmlns:a16="http://schemas.microsoft.com/office/drawing/2014/main" id="{99910A12-A022-437A-9B9E-0591DCEA05F7}"/>
+              </a:ext>
+            </a:extLst>
+          </p:cNvPr>
+          <p:cNvSpPr/>
+          <p:nvPr/>
+        </p:nvSpPr>
+        <p:spPr>
+          <a:xfrm rot="11160879" flipV="1">
+            <a:off x="11392482" y="4523969"/>
             <a:ext cx="307875" cy="643271"/>
           </a:xfrm>
           <a:prstGeom prst="curvedRightArrow">

</xml_diff>